<commit_message>
[2008.08.22][siva] ## 1차 커밋 실패.
+ 기본 프레임 pilot 프로그램 1차 완성
 - Raptor 기본 컴포넌트 작성
 - 컴포넌트 간 SD 작성
 - 컴포넌트 간 통신 테스트 미완

+ doxygen 도입
 - 기본 프레임 프로젝트에 mainpage.dox 생성
 - /trunk/Documents/from_doxygen 폴더에 문서화 결과 저장(1차 커밋 실패 후 undo Add)
 - /trunk/Documents/from_doxygen 폴더에 doxygen 세팅 파일(Doxyfile) 저장.
 - 기본 프레임 프로젝트에 doxygen 주석 작성

+ /trunk/Documents/lokapala_architecture.pptx 부분 수정
</commit_message>
<xml_diff>
--- a/Documents/lokapala_architecture.pptx
+++ b/Documents/lokapala_architecture.pptx
@@ -4562,6 +4562,7 @@
                 <a:lumOff val="50000"/>
               </a:schemeClr>
             </a:solidFill>
+            <a:headEnd type="triangle"/>
             <a:tailEnd type="triangle"/>
           </a:ln>
         </p:spPr>
@@ -6612,6 +6613,7 @@
                 <a:lumOff val="50000"/>
               </a:schemeClr>
             </a:solidFill>
+            <a:headEnd type="triangle"/>
             <a:tailEnd type="triangle"/>
           </a:ln>
         </p:spPr>
@@ -6662,6 +6664,7 @@
                 <a:lumOff val="50000"/>
               </a:schemeClr>
             </a:solidFill>
+            <a:headEnd type="triangle"/>
             <a:tailEnd type="triangle"/>
           </a:ln>
         </p:spPr>
@@ -6713,7 +6716,7 @@
               </a:schemeClr>
             </a:solidFill>
             <a:headEnd type="triangle"/>
-            <a:tailEnd type="none"/>
+            <a:tailEnd type="triangle"/>
           </a:ln>
         </p:spPr>
         <p:style>
@@ -8475,15 +8478,6 @@
               </a:rPr>
               <a:t>Controller</a:t>
             </a:r>
-            <a:endParaRPr lang="en-US" altLang="ko-KR" b="1" dirty="0" smtClean="0">
-              <a:solidFill>
-                <a:schemeClr val="bg1">
-                  <a:lumMod val="95000"/>
-                </a:schemeClr>
-              </a:solidFill>
-              <a:latin typeface="Tahoma" pitchFamily="34" charset="0"/>
-              <a:ea typeface="돋움체" pitchFamily="49" charset="-127"/>
-            </a:endParaRPr>
           </a:p>
         </p:txBody>
       </p:sp>

</xml_diff>